<commit_message>
font-family adjusted + ppt
</commit_message>
<xml_diff>
--- a/Powerpoint-presentatie/JR-Webdevelopment presents PC4U.pptx
+++ b/Powerpoint-presentatie/JR-Webdevelopment presents PC4U.pptx
@@ -8,6 +8,11 @@
     <p:sldId id="256" r:id="rId2"/>
     <p:sldId id="257" r:id="rId3"/>
     <p:sldId id="258" r:id="rId4"/>
+    <p:sldId id="259" r:id="rId5"/>
+    <p:sldId id="260" r:id="rId6"/>
+    <p:sldId id="261" r:id="rId7"/>
+    <p:sldId id="262" r:id="rId8"/>
+    <p:sldId id="263" r:id="rId9"/>
   </p:sldIdLst>
   <p:sldSz cx="12192000" cy="6858000"/>
   <p:notesSz cx="6858000" cy="9144000"/>
@@ -245,7 +250,7 @@
           <a:p>
             <a:fld id="{02CEDFC6-84DF-48E9-9A82-ECD26472881E}" type="datetimeFigureOut">
               <a:rPr lang="nl-NL" smtClean="0"/>
-              <a:t>6-1-2016</a:t>
+              <a:t>11-1-2016</a:t>
             </a:fld>
             <a:endParaRPr lang="nl-NL"/>
           </a:p>
@@ -415,7 +420,7 @@
           <a:p>
             <a:fld id="{02CEDFC6-84DF-48E9-9A82-ECD26472881E}" type="datetimeFigureOut">
               <a:rPr lang="nl-NL" smtClean="0"/>
-              <a:t>6-1-2016</a:t>
+              <a:t>11-1-2016</a:t>
             </a:fld>
             <a:endParaRPr lang="nl-NL"/>
           </a:p>
@@ -595,7 +600,7 @@
           <a:p>
             <a:fld id="{02CEDFC6-84DF-48E9-9A82-ECD26472881E}" type="datetimeFigureOut">
               <a:rPr lang="nl-NL" smtClean="0"/>
-              <a:t>6-1-2016</a:t>
+              <a:t>11-1-2016</a:t>
             </a:fld>
             <a:endParaRPr lang="nl-NL"/>
           </a:p>
@@ -765,7 +770,7 @@
           <a:p>
             <a:fld id="{02CEDFC6-84DF-48E9-9A82-ECD26472881E}" type="datetimeFigureOut">
               <a:rPr lang="nl-NL" smtClean="0"/>
-              <a:t>6-1-2016</a:t>
+              <a:t>11-1-2016</a:t>
             </a:fld>
             <a:endParaRPr lang="nl-NL"/>
           </a:p>
@@ -1011,7 +1016,7 @@
           <a:p>
             <a:fld id="{02CEDFC6-84DF-48E9-9A82-ECD26472881E}" type="datetimeFigureOut">
               <a:rPr lang="nl-NL" smtClean="0"/>
-              <a:t>6-1-2016</a:t>
+              <a:t>11-1-2016</a:t>
             </a:fld>
             <a:endParaRPr lang="nl-NL"/>
           </a:p>
@@ -1243,7 +1248,7 @@
           <a:p>
             <a:fld id="{02CEDFC6-84DF-48E9-9A82-ECD26472881E}" type="datetimeFigureOut">
               <a:rPr lang="nl-NL" smtClean="0"/>
-              <a:t>6-1-2016</a:t>
+              <a:t>11-1-2016</a:t>
             </a:fld>
             <a:endParaRPr lang="nl-NL"/>
           </a:p>
@@ -1610,7 +1615,7 @@
           <a:p>
             <a:fld id="{02CEDFC6-84DF-48E9-9A82-ECD26472881E}" type="datetimeFigureOut">
               <a:rPr lang="nl-NL" smtClean="0"/>
-              <a:t>6-1-2016</a:t>
+              <a:t>11-1-2016</a:t>
             </a:fld>
             <a:endParaRPr lang="nl-NL"/>
           </a:p>
@@ -1728,7 +1733,7 @@
           <a:p>
             <a:fld id="{02CEDFC6-84DF-48E9-9A82-ECD26472881E}" type="datetimeFigureOut">
               <a:rPr lang="nl-NL" smtClean="0"/>
-              <a:t>6-1-2016</a:t>
+              <a:t>11-1-2016</a:t>
             </a:fld>
             <a:endParaRPr lang="nl-NL"/>
           </a:p>
@@ -1823,7 +1828,7 @@
           <a:p>
             <a:fld id="{02CEDFC6-84DF-48E9-9A82-ECD26472881E}" type="datetimeFigureOut">
               <a:rPr lang="nl-NL" smtClean="0"/>
-              <a:t>6-1-2016</a:t>
+              <a:t>11-1-2016</a:t>
             </a:fld>
             <a:endParaRPr lang="nl-NL"/>
           </a:p>
@@ -2100,7 +2105,7 @@
           <a:p>
             <a:fld id="{02CEDFC6-84DF-48E9-9A82-ECD26472881E}" type="datetimeFigureOut">
               <a:rPr lang="nl-NL" smtClean="0"/>
-              <a:t>6-1-2016</a:t>
+              <a:t>11-1-2016</a:t>
             </a:fld>
             <a:endParaRPr lang="nl-NL"/>
           </a:p>
@@ -2353,7 +2358,7 @@
           <a:p>
             <a:fld id="{02CEDFC6-84DF-48E9-9A82-ECD26472881E}" type="datetimeFigureOut">
               <a:rPr lang="nl-NL" smtClean="0"/>
-              <a:t>6-1-2016</a:t>
+              <a:t>11-1-2016</a:t>
             </a:fld>
             <a:endParaRPr lang="nl-NL"/>
           </a:p>
@@ -2576,7 +2581,7 @@
           <a:p>
             <a:fld id="{02CEDFC6-84DF-48E9-9A82-ECD26472881E}" type="datetimeFigureOut">
               <a:rPr lang="nl-NL" smtClean="0"/>
-              <a:t>6-1-2016</a:t>
+              <a:t>11-1-2016</a:t>
             </a:fld>
             <a:endParaRPr lang="nl-NL"/>
           </a:p>
@@ -3149,8 +3154,12 @@
           <a:lstStyle/>
           <a:p>
             <a:r>
+              <a:rPr lang="nl-NL" b="1" dirty="0" smtClean="0"/>
+              <a:t>Onze agendapunten:</a:t>
+            </a:r>
+            <a:r>
               <a:rPr lang="nl-NL" dirty="0" smtClean="0"/>
-              <a:t>Onze agendapunten:	</a:t>
+              <a:t>	</a:t>
             </a:r>
             <a:endParaRPr lang="nl-NL" dirty="0"/>
           </a:p>
@@ -3179,8 +3188,13 @@
           <a:p>
             <a:r>
               <a:rPr lang="nl-NL" dirty="0" smtClean="0"/>
-              <a:t>Van interview tot eindresultaat</a:t>
-            </a:r>
+              <a:t>Van interview tot </a:t>
+            </a:r>
+            <a:r>
+              <a:rPr lang="nl-NL" dirty="0" smtClean="0"/>
+              <a:t>eindproduct</a:t>
+            </a:r>
+            <a:endParaRPr lang="nl-NL" dirty="0" smtClean="0"/>
           </a:p>
           <a:p>
             <a:r>
@@ -3210,7 +3224,11 @@
             <a:pPr lvl="1"/>
             <a:r>
               <a:rPr lang="nl-NL" dirty="0" smtClean="0"/>
-              <a:t>Opdrachtgever – JR-</a:t>
+              <a:t>Tussen de opdrachtgever en </a:t>
+            </a:r>
+            <a:r>
+              <a:rPr lang="nl-NL" dirty="0" smtClean="0"/>
+              <a:t>JR-</a:t>
             </a:r>
             <a:r>
               <a:rPr lang="nl-NL" dirty="0" err="1" smtClean="0"/>
@@ -3277,7 +3295,11 @@
           <a:bodyPr/>
           <a:lstStyle/>
           <a:p>
-            <a:endParaRPr lang="nl-NL"/>
+            <a:r>
+              <a:rPr lang="nl-NL" b="1" dirty="0" smtClean="0"/>
+              <a:t>Verloop van het project	</a:t>
+            </a:r>
+            <a:endParaRPr lang="nl-NL" b="1" dirty="0"/>
           </a:p>
         </p:txBody>
       </p:sp>
@@ -3296,7 +3318,49 @@
           <a:bodyPr/>
           <a:lstStyle/>
           <a:p>
-            <a:endParaRPr lang="nl-NL"/>
+            <a:r>
+              <a:rPr lang="nl-NL" dirty="0"/>
+              <a:t>Eerste kennismaking met </a:t>
+            </a:r>
+            <a:r>
+              <a:rPr lang="nl-NL" dirty="0" smtClean="0"/>
+              <a:t>project</a:t>
+            </a:r>
+          </a:p>
+          <a:p>
+            <a:r>
+              <a:rPr lang="nl-NL" dirty="0" smtClean="0"/>
+              <a:t>Verdeling van de taken</a:t>
+            </a:r>
+            <a:endParaRPr lang="nl-NL" dirty="0"/>
+          </a:p>
+          <a:p>
+            <a:r>
+              <a:rPr lang="nl-NL" dirty="0" smtClean="0"/>
+              <a:t>Veel maar nodige documentatie</a:t>
+            </a:r>
+          </a:p>
+          <a:p>
+            <a:r>
+              <a:rPr lang="nl-NL" dirty="0" smtClean="0"/>
+              <a:t>‘Wachten’ tot het programmeren</a:t>
+            </a:r>
+          </a:p>
+          <a:p>
+            <a:r>
+              <a:rPr lang="nl-NL" dirty="0" smtClean="0"/>
+              <a:t>Het programmeren zelf</a:t>
+            </a:r>
+          </a:p>
+          <a:p>
+            <a:r>
+              <a:rPr lang="nl-NL" dirty="0" smtClean="0"/>
+              <a:t>Afronding</a:t>
+            </a:r>
+            <a:endParaRPr lang="nl-NL" dirty="0" smtClean="0"/>
+          </a:p>
+          <a:p>
+            <a:endParaRPr lang="nl-NL" dirty="0"/>
           </a:p>
         </p:txBody>
       </p:sp>
@@ -3304,6 +3368,400 @@
     <p:extLst>
       <p:ext uri="{BB962C8B-B14F-4D97-AF65-F5344CB8AC3E}">
         <p14:creationId xmlns:p14="http://schemas.microsoft.com/office/powerpoint/2010/main" val="1470292730"/>
+      </p:ext>
+    </p:extLst>
+  </p:cSld>
+  <p:clrMapOvr>
+    <a:masterClrMapping/>
+  </p:clrMapOvr>
+</p:sld>
+</file>
+
+<file path=ppt/slides/slide4.xml><?xml version="1.0" encoding="utf-8"?>
+<p:sld xmlns:a="http://schemas.openxmlformats.org/drawingml/2006/main" xmlns:r="http://schemas.openxmlformats.org/officeDocument/2006/relationships" xmlns:p="http://schemas.openxmlformats.org/presentationml/2006/main">
+  <p:cSld>
+    <p:spTree>
+      <p:nvGrpSpPr>
+        <p:cNvPr id="1" name=""/>
+        <p:cNvGrpSpPr/>
+        <p:nvPr/>
+      </p:nvGrpSpPr>
+      <p:grpSpPr>
+        <a:xfrm>
+          <a:off x="0" y="0"/>
+          <a:ext cx="0" cy="0"/>
+          <a:chOff x="0" y="0"/>
+          <a:chExt cx="0" cy="0"/>
+        </a:xfrm>
+      </p:grpSpPr>
+      <p:sp>
+        <p:nvSpPr>
+          <p:cNvPr id="2" name="Titel 1"/>
+          <p:cNvSpPr>
+            <a:spLocks noGrp="1"/>
+          </p:cNvSpPr>
+          <p:nvPr>
+            <p:ph type="title"/>
+          </p:nvPr>
+        </p:nvSpPr>
+        <p:spPr/>
+        <p:txBody>
+          <a:bodyPr/>
+          <a:lstStyle/>
+          <a:p>
+            <a:r>
+              <a:rPr lang="nl-NL" b="1" dirty="0" smtClean="0"/>
+              <a:t>Van interview tot eindproduct</a:t>
+            </a:r>
+            <a:endParaRPr lang="nl-NL" b="1" dirty="0"/>
+          </a:p>
+        </p:txBody>
+      </p:sp>
+      <p:sp>
+        <p:nvSpPr>
+          <p:cNvPr id="3" name="Tijdelijke aanduiding voor inhoud 2"/>
+          <p:cNvSpPr>
+            <a:spLocks noGrp="1"/>
+          </p:cNvSpPr>
+          <p:nvPr>
+            <p:ph idx="1"/>
+          </p:nvPr>
+        </p:nvSpPr>
+        <p:spPr/>
+        <p:txBody>
+          <a:bodyPr/>
+          <a:lstStyle/>
+          <a:p>
+            <a:endParaRPr lang="nl-NL"/>
+          </a:p>
+        </p:txBody>
+      </p:sp>
+    </p:spTree>
+    <p:extLst>
+      <p:ext uri="{BB962C8B-B14F-4D97-AF65-F5344CB8AC3E}">
+        <p14:creationId xmlns:p14="http://schemas.microsoft.com/office/powerpoint/2010/main" val="2493555386"/>
+      </p:ext>
+    </p:extLst>
+  </p:cSld>
+  <p:clrMapOvr>
+    <a:masterClrMapping/>
+  </p:clrMapOvr>
+</p:sld>
+</file>
+
+<file path=ppt/slides/slide5.xml><?xml version="1.0" encoding="utf-8"?>
+<p:sld xmlns:a="http://schemas.openxmlformats.org/drawingml/2006/main" xmlns:r="http://schemas.openxmlformats.org/officeDocument/2006/relationships" xmlns:p="http://schemas.openxmlformats.org/presentationml/2006/main">
+  <p:cSld>
+    <p:spTree>
+      <p:nvGrpSpPr>
+        <p:cNvPr id="1" name=""/>
+        <p:cNvGrpSpPr/>
+        <p:nvPr/>
+      </p:nvGrpSpPr>
+      <p:grpSpPr>
+        <a:xfrm>
+          <a:off x="0" y="0"/>
+          <a:ext cx="0" cy="0"/>
+          <a:chOff x="0" y="0"/>
+          <a:chExt cx="0" cy="0"/>
+        </a:xfrm>
+      </p:grpSpPr>
+      <p:sp>
+        <p:nvSpPr>
+          <p:cNvPr id="2" name="Titel 1"/>
+          <p:cNvSpPr>
+            <a:spLocks noGrp="1"/>
+          </p:cNvSpPr>
+          <p:nvPr>
+            <p:ph type="title"/>
+          </p:nvPr>
+        </p:nvSpPr>
+        <p:spPr/>
+        <p:txBody>
+          <a:bodyPr/>
+          <a:lstStyle/>
+          <a:p>
+            <a:r>
+              <a:rPr lang="nl-NL" b="1" dirty="0"/>
+              <a:t>De eisen van de </a:t>
+            </a:r>
+            <a:r>
+              <a:rPr lang="nl-NL" b="1" dirty="0" smtClean="0"/>
+              <a:t>prototypewebsite</a:t>
+            </a:r>
+            <a:endParaRPr lang="nl-NL" b="1" dirty="0"/>
+          </a:p>
+        </p:txBody>
+      </p:sp>
+      <p:sp>
+        <p:nvSpPr>
+          <p:cNvPr id="3" name="Tijdelijke aanduiding voor inhoud 2"/>
+          <p:cNvSpPr>
+            <a:spLocks noGrp="1"/>
+          </p:cNvSpPr>
+          <p:nvPr>
+            <p:ph idx="1"/>
+          </p:nvPr>
+        </p:nvSpPr>
+        <p:spPr/>
+        <p:txBody>
+          <a:bodyPr/>
+          <a:lstStyle/>
+          <a:p>
+            <a:endParaRPr lang="nl-NL"/>
+          </a:p>
+        </p:txBody>
+      </p:sp>
+    </p:spTree>
+    <p:extLst>
+      <p:ext uri="{BB962C8B-B14F-4D97-AF65-F5344CB8AC3E}">
+        <p14:creationId xmlns:p14="http://schemas.microsoft.com/office/powerpoint/2010/main" val="3424115504"/>
+      </p:ext>
+    </p:extLst>
+  </p:cSld>
+  <p:clrMapOvr>
+    <a:masterClrMapping/>
+  </p:clrMapOvr>
+</p:sld>
+</file>
+
+<file path=ppt/slides/slide6.xml><?xml version="1.0" encoding="utf-8"?>
+<p:sld xmlns:a="http://schemas.openxmlformats.org/drawingml/2006/main" xmlns:r="http://schemas.openxmlformats.org/officeDocument/2006/relationships" xmlns:p="http://schemas.openxmlformats.org/presentationml/2006/main">
+  <p:cSld>
+    <p:spTree>
+      <p:nvGrpSpPr>
+        <p:cNvPr id="1" name=""/>
+        <p:cNvGrpSpPr/>
+        <p:nvPr/>
+      </p:nvGrpSpPr>
+      <p:grpSpPr>
+        <a:xfrm>
+          <a:off x="0" y="0"/>
+          <a:ext cx="0" cy="0"/>
+          <a:chOff x="0" y="0"/>
+          <a:chExt cx="0" cy="0"/>
+        </a:xfrm>
+      </p:grpSpPr>
+      <p:sp>
+        <p:nvSpPr>
+          <p:cNvPr id="2" name="Titel 1"/>
+          <p:cNvSpPr>
+            <a:spLocks noGrp="1"/>
+          </p:cNvSpPr>
+          <p:nvPr>
+            <p:ph type="title"/>
+          </p:nvPr>
+        </p:nvSpPr>
+        <p:spPr/>
+        <p:txBody>
+          <a:bodyPr>
+            <a:normAutofit/>
+          </a:bodyPr>
+          <a:lstStyle/>
+          <a:p>
+            <a:r>
+              <a:rPr lang="nl-NL" sz="3600" b="1" dirty="0"/>
+              <a:t>Wat we hebben gedaan om aan de eisen te </a:t>
+            </a:r>
+            <a:r>
+              <a:rPr lang="nl-NL" sz="3600" b="1" dirty="0" smtClean="0"/>
+              <a:t>voldoen</a:t>
+            </a:r>
+            <a:endParaRPr lang="nl-NL" sz="3600" b="1" dirty="0"/>
+          </a:p>
+        </p:txBody>
+      </p:sp>
+      <p:sp>
+        <p:nvSpPr>
+          <p:cNvPr id="3" name="Tijdelijke aanduiding voor inhoud 2"/>
+          <p:cNvSpPr>
+            <a:spLocks noGrp="1"/>
+          </p:cNvSpPr>
+          <p:nvPr>
+            <p:ph idx="1"/>
+          </p:nvPr>
+        </p:nvSpPr>
+        <p:spPr/>
+        <p:txBody>
+          <a:bodyPr/>
+          <a:lstStyle/>
+          <a:p>
+            <a:endParaRPr lang="nl-NL" dirty="0"/>
+          </a:p>
+        </p:txBody>
+      </p:sp>
+    </p:spTree>
+    <p:extLst>
+      <p:ext uri="{BB962C8B-B14F-4D97-AF65-F5344CB8AC3E}">
+        <p14:creationId xmlns:p14="http://schemas.microsoft.com/office/powerpoint/2010/main" val="1101913471"/>
+      </p:ext>
+    </p:extLst>
+  </p:cSld>
+  <p:clrMapOvr>
+    <a:masterClrMapping/>
+  </p:clrMapOvr>
+</p:sld>
+</file>
+
+<file path=ppt/slides/slide7.xml><?xml version="1.0" encoding="utf-8"?>
+<p:sld xmlns:a="http://schemas.openxmlformats.org/drawingml/2006/main" xmlns:r="http://schemas.openxmlformats.org/officeDocument/2006/relationships" xmlns:p="http://schemas.openxmlformats.org/presentationml/2006/main">
+  <p:cSld>
+    <p:spTree>
+      <p:nvGrpSpPr>
+        <p:cNvPr id="1" name=""/>
+        <p:cNvGrpSpPr/>
+        <p:nvPr/>
+      </p:nvGrpSpPr>
+      <p:grpSpPr>
+        <a:xfrm>
+          <a:off x="0" y="0"/>
+          <a:ext cx="0" cy="0"/>
+          <a:chOff x="0" y="0"/>
+          <a:chExt cx="0" cy="0"/>
+        </a:xfrm>
+      </p:grpSpPr>
+      <p:sp>
+        <p:nvSpPr>
+          <p:cNvPr id="2" name="Titel 1"/>
+          <p:cNvSpPr>
+            <a:spLocks noGrp="1"/>
+          </p:cNvSpPr>
+          <p:nvPr>
+            <p:ph type="title"/>
+          </p:nvPr>
+        </p:nvSpPr>
+        <p:spPr/>
+        <p:txBody>
+          <a:bodyPr/>
+          <a:lstStyle/>
+          <a:p>
+            <a:r>
+              <a:rPr lang="nl-NL" b="1" dirty="0"/>
+              <a:t>Het </a:t>
+            </a:r>
+            <a:r>
+              <a:rPr lang="nl-NL" b="1" dirty="0" smtClean="0"/>
+              <a:t>eindproduct</a:t>
+            </a:r>
+            <a:endParaRPr lang="nl-NL" b="1" dirty="0"/>
+          </a:p>
+        </p:txBody>
+      </p:sp>
+      <p:pic>
+        <p:nvPicPr>
+          <p:cNvPr id="4" name="Tijdelijke aanduiding voor inhoud 3"/>
+          <p:cNvPicPr>
+            <a:picLocks noGrp="1" noChangeAspect="1"/>
+          </p:cNvPicPr>
+          <p:nvPr>
+            <p:ph idx="1"/>
+          </p:nvPr>
+        </p:nvPicPr>
+        <p:blipFill rotWithShape="1">
+          <a:blip r:embed="rId2"/>
+          <a:srcRect t="7734" b="5363"/>
+          <a:stretch/>
+        </p:blipFill>
+        <p:spPr>
+          <a:xfrm>
+            <a:off x="1336686" y="1462088"/>
+            <a:ext cx="9518627" cy="4652962"/>
+          </a:xfrm>
+          <a:prstGeom prst="rect">
+            <a:avLst/>
+          </a:prstGeom>
+        </p:spPr>
+      </p:pic>
+    </p:spTree>
+    <p:extLst>
+      <p:ext uri="{BB962C8B-B14F-4D97-AF65-F5344CB8AC3E}">
+        <p14:creationId xmlns:p14="http://schemas.microsoft.com/office/powerpoint/2010/main" val="2677197570"/>
+      </p:ext>
+    </p:extLst>
+  </p:cSld>
+  <p:clrMapOvr>
+    <a:masterClrMapping/>
+  </p:clrMapOvr>
+</p:sld>
+</file>
+
+<file path=ppt/slides/slide8.xml><?xml version="1.0" encoding="utf-8"?>
+<p:sld xmlns:a="http://schemas.openxmlformats.org/drawingml/2006/main" xmlns:r="http://schemas.openxmlformats.org/officeDocument/2006/relationships" xmlns:p="http://schemas.openxmlformats.org/presentationml/2006/main">
+  <p:cSld>
+    <p:spTree>
+      <p:nvGrpSpPr>
+        <p:cNvPr id="1" name=""/>
+        <p:cNvGrpSpPr/>
+        <p:nvPr/>
+      </p:nvGrpSpPr>
+      <p:grpSpPr>
+        <a:xfrm>
+          <a:off x="0" y="0"/>
+          <a:ext cx="0" cy="0"/>
+          <a:chOff x="0" y="0"/>
+          <a:chExt cx="0" cy="0"/>
+        </a:xfrm>
+      </p:grpSpPr>
+      <p:sp>
+        <p:nvSpPr>
+          <p:cNvPr id="2" name="Titel 1"/>
+          <p:cNvSpPr>
+            <a:spLocks noGrp="1"/>
+          </p:cNvSpPr>
+          <p:nvPr>
+            <p:ph type="title"/>
+          </p:nvPr>
+        </p:nvSpPr>
+        <p:spPr/>
+        <p:txBody>
+          <a:bodyPr/>
+          <a:lstStyle/>
+          <a:p>
+            <a:r>
+              <a:rPr lang="nl-NL" b="1" dirty="0"/>
+              <a:t>Hoe is de samenwerking verlopen</a:t>
+            </a:r>
+            <a:r>
+              <a:rPr lang="nl-NL" b="1" dirty="0" smtClean="0"/>
+              <a:t>?</a:t>
+            </a:r>
+            <a:endParaRPr lang="nl-NL" b="1" dirty="0"/>
+          </a:p>
+        </p:txBody>
+      </p:sp>
+      <p:sp>
+        <p:nvSpPr>
+          <p:cNvPr id="3" name="Tijdelijke aanduiding voor inhoud 2"/>
+          <p:cNvSpPr>
+            <a:spLocks noGrp="1"/>
+          </p:cNvSpPr>
+          <p:nvPr>
+            <p:ph idx="1"/>
+          </p:nvPr>
+        </p:nvSpPr>
+        <p:spPr/>
+        <p:txBody>
+          <a:bodyPr/>
+          <a:lstStyle/>
+          <a:p>
+            <a:r>
+              <a:rPr lang="nl-NL" dirty="0" smtClean="0"/>
+              <a:t>Tussen de opdrachtgever en JR-development</a:t>
+            </a:r>
+          </a:p>
+          <a:p>
+            <a:r>
+              <a:rPr lang="nl-NL" dirty="0" smtClean="0"/>
+              <a:t>Binnen JR-development</a:t>
+            </a:r>
+            <a:endParaRPr lang="nl-NL" dirty="0"/>
+          </a:p>
+        </p:txBody>
+      </p:sp>
+    </p:spTree>
+    <p:extLst>
+      <p:ext uri="{BB962C8B-B14F-4D97-AF65-F5344CB8AC3E}">
+        <p14:creationId xmlns:p14="http://schemas.microsoft.com/office/powerpoint/2010/main" val="753953652"/>
       </p:ext>
     </p:extLst>
   </p:cSld>

</xml_diff>

<commit_message>
changes different pages for website and ppt
</commit_message>
<xml_diff>
--- a/Powerpoint-presentatie/JR-Webdevelopment presents PC4U.pptx
+++ b/Powerpoint-presentatie/JR-Webdevelopment presents PC4U.pptx
@@ -251,7 +251,7 @@
           <a:p>
             <a:fld id="{02CEDFC6-84DF-48E9-9A82-ECD26472881E}" type="datetimeFigureOut">
               <a:rPr lang="nl-NL" smtClean="0"/>
-              <a:t>11-1-2016</a:t>
+              <a:t>12-1-2016</a:t>
             </a:fld>
             <a:endParaRPr lang="nl-NL"/>
           </a:p>
@@ -421,7 +421,7 @@
           <a:p>
             <a:fld id="{02CEDFC6-84DF-48E9-9A82-ECD26472881E}" type="datetimeFigureOut">
               <a:rPr lang="nl-NL" smtClean="0"/>
-              <a:t>11-1-2016</a:t>
+              <a:t>12-1-2016</a:t>
             </a:fld>
             <a:endParaRPr lang="nl-NL"/>
           </a:p>
@@ -601,7 +601,7 @@
           <a:p>
             <a:fld id="{02CEDFC6-84DF-48E9-9A82-ECD26472881E}" type="datetimeFigureOut">
               <a:rPr lang="nl-NL" smtClean="0"/>
-              <a:t>11-1-2016</a:t>
+              <a:t>12-1-2016</a:t>
             </a:fld>
             <a:endParaRPr lang="nl-NL"/>
           </a:p>
@@ -771,7 +771,7 @@
           <a:p>
             <a:fld id="{02CEDFC6-84DF-48E9-9A82-ECD26472881E}" type="datetimeFigureOut">
               <a:rPr lang="nl-NL" smtClean="0"/>
-              <a:t>11-1-2016</a:t>
+              <a:t>12-1-2016</a:t>
             </a:fld>
             <a:endParaRPr lang="nl-NL"/>
           </a:p>
@@ -1017,7 +1017,7 @@
           <a:p>
             <a:fld id="{02CEDFC6-84DF-48E9-9A82-ECD26472881E}" type="datetimeFigureOut">
               <a:rPr lang="nl-NL" smtClean="0"/>
-              <a:t>11-1-2016</a:t>
+              <a:t>12-1-2016</a:t>
             </a:fld>
             <a:endParaRPr lang="nl-NL"/>
           </a:p>
@@ -1249,7 +1249,7 @@
           <a:p>
             <a:fld id="{02CEDFC6-84DF-48E9-9A82-ECD26472881E}" type="datetimeFigureOut">
               <a:rPr lang="nl-NL" smtClean="0"/>
-              <a:t>11-1-2016</a:t>
+              <a:t>12-1-2016</a:t>
             </a:fld>
             <a:endParaRPr lang="nl-NL"/>
           </a:p>
@@ -1616,7 +1616,7 @@
           <a:p>
             <a:fld id="{02CEDFC6-84DF-48E9-9A82-ECD26472881E}" type="datetimeFigureOut">
               <a:rPr lang="nl-NL" smtClean="0"/>
-              <a:t>11-1-2016</a:t>
+              <a:t>12-1-2016</a:t>
             </a:fld>
             <a:endParaRPr lang="nl-NL"/>
           </a:p>
@@ -1734,7 +1734,7 @@
           <a:p>
             <a:fld id="{02CEDFC6-84DF-48E9-9A82-ECD26472881E}" type="datetimeFigureOut">
               <a:rPr lang="nl-NL" smtClean="0"/>
-              <a:t>11-1-2016</a:t>
+              <a:t>12-1-2016</a:t>
             </a:fld>
             <a:endParaRPr lang="nl-NL"/>
           </a:p>
@@ -1829,7 +1829,7 @@
           <a:p>
             <a:fld id="{02CEDFC6-84DF-48E9-9A82-ECD26472881E}" type="datetimeFigureOut">
               <a:rPr lang="nl-NL" smtClean="0"/>
-              <a:t>11-1-2016</a:t>
+              <a:t>12-1-2016</a:t>
             </a:fld>
             <a:endParaRPr lang="nl-NL"/>
           </a:p>
@@ -2106,7 +2106,7 @@
           <a:p>
             <a:fld id="{02CEDFC6-84DF-48E9-9A82-ECD26472881E}" type="datetimeFigureOut">
               <a:rPr lang="nl-NL" smtClean="0"/>
-              <a:t>11-1-2016</a:t>
+              <a:t>12-1-2016</a:t>
             </a:fld>
             <a:endParaRPr lang="nl-NL"/>
           </a:p>
@@ -2359,7 +2359,7 @@
           <a:p>
             <a:fld id="{02CEDFC6-84DF-48E9-9A82-ECD26472881E}" type="datetimeFigureOut">
               <a:rPr lang="nl-NL" smtClean="0"/>
-              <a:t>11-1-2016</a:t>
+              <a:t>12-1-2016</a:t>
             </a:fld>
             <a:endParaRPr lang="nl-NL"/>
           </a:p>
@@ -2582,7 +2582,7 @@
           <a:p>
             <a:fld id="{02CEDFC6-84DF-48E9-9A82-ECD26472881E}" type="datetimeFigureOut">
               <a:rPr lang="nl-NL" smtClean="0"/>
-              <a:t>11-1-2016</a:t>
+              <a:t>12-1-2016</a:t>
             </a:fld>
             <a:endParaRPr lang="nl-NL"/>
           </a:p>
@@ -3045,7 +3045,7 @@
         </p:nvSpPr>
         <p:spPr>
           <a:xfrm>
-            <a:off x="2919411" y="2463662"/>
+            <a:off x="2919411" y="2869103"/>
             <a:ext cx="6353175" cy="1827212"/>
           </a:xfrm>
           <a:blipFill dpi="0" rotWithShape="1">
@@ -3422,10 +3422,88 @@
         </p:nvSpPr>
         <p:spPr/>
         <p:txBody>
-          <a:bodyPr/>
-          <a:lstStyle/>
-          <a:p>
-            <a:endParaRPr lang="nl-NL"/>
+          <a:bodyPr>
+            <a:normAutofit fontScale="92500" lnSpcReduction="20000"/>
+          </a:bodyPr>
+          <a:lstStyle/>
+          <a:p>
+            <a:r>
+              <a:rPr lang="nl-NL" dirty="0" smtClean="0"/>
+              <a:t>Brainstorm voor interview</a:t>
+            </a:r>
+          </a:p>
+          <a:p>
+            <a:r>
+              <a:rPr lang="nl-NL" dirty="0" smtClean="0"/>
+              <a:t>Interview</a:t>
+            </a:r>
+          </a:p>
+          <a:p>
+            <a:r>
+              <a:rPr lang="nl-NL" dirty="0" smtClean="0"/>
+              <a:t>Plan van aanpak met projecteisen</a:t>
+            </a:r>
+          </a:p>
+          <a:p>
+            <a:r>
+              <a:rPr lang="nl-NL" dirty="0" err="1" smtClean="0"/>
+              <a:t>Wireframes</a:t>
+            </a:r>
+            <a:r>
+              <a:rPr lang="nl-NL" dirty="0" smtClean="0"/>
+              <a:t>, </a:t>
+            </a:r>
+            <a:r>
+              <a:rPr lang="nl-NL" dirty="0" err="1" smtClean="0"/>
+              <a:t>moodboard</a:t>
+            </a:r>
+            <a:r>
+              <a:rPr lang="nl-NL" dirty="0"/>
+              <a:t> </a:t>
+            </a:r>
+            <a:r>
+              <a:rPr lang="nl-NL" dirty="0" smtClean="0"/>
+              <a:t>en logo</a:t>
+            </a:r>
+          </a:p>
+          <a:p>
+            <a:r>
+              <a:rPr lang="nl-NL" dirty="0" smtClean="0"/>
+              <a:t>Sitemap en materialenlijst</a:t>
+            </a:r>
+          </a:p>
+          <a:p>
+            <a:r>
+              <a:rPr lang="nl-NL" dirty="0" smtClean="0"/>
+              <a:t>Programmeren van de website en de acceptatietest</a:t>
+            </a:r>
+          </a:p>
+          <a:p>
+            <a:r>
+              <a:rPr lang="nl-NL" dirty="0" smtClean="0"/>
+              <a:t>Doorlopend het logboek bijgewerkt</a:t>
+            </a:r>
+          </a:p>
+          <a:p>
+            <a:r>
+              <a:rPr lang="nl-NL" dirty="0" smtClean="0"/>
+              <a:t>Online zetten</a:t>
+            </a:r>
+          </a:p>
+          <a:p>
+            <a:r>
+              <a:rPr lang="nl-NL" dirty="0" smtClean="0"/>
+              <a:t>Optimalisatie</a:t>
+            </a:r>
+          </a:p>
+          <a:p>
+            <a:r>
+              <a:rPr lang="nl-NL" dirty="0" smtClean="0"/>
+              <a:t>Afronding</a:t>
+            </a:r>
+          </a:p>
+          <a:p>
+            <a:endParaRPr lang="nl-NL" dirty="0" smtClean="0"/>
           </a:p>
         </p:txBody>
       </p:sp>
@@ -3496,12 +3574,203 @@
             <p:ph idx="1"/>
           </p:nvPr>
         </p:nvSpPr>
-        <p:spPr/>
-        <p:txBody>
-          <a:bodyPr/>
-          <a:lstStyle/>
-          <a:p>
-            <a:endParaRPr lang="nl-NL"/>
+        <p:spPr>
+          <a:xfrm>
+            <a:off x="838200" y="1414732"/>
+            <a:ext cx="10515600" cy="5141704"/>
+          </a:xfrm>
+        </p:spPr>
+        <p:txBody>
+          <a:bodyPr>
+            <a:normAutofit fontScale="85000" lnSpcReduction="20000"/>
+          </a:bodyPr>
+          <a:lstStyle/>
+          <a:p>
+            <a:r>
+              <a:rPr lang="nl-NL" dirty="0" smtClean="0"/>
+              <a:t>Must-</a:t>
+            </a:r>
+            <a:r>
+              <a:rPr lang="nl-NL" dirty="0" err="1" smtClean="0"/>
+              <a:t>haves</a:t>
+            </a:r>
+            <a:r>
+              <a:rPr lang="nl-NL" dirty="0" smtClean="0"/>
+              <a:t>:</a:t>
+            </a:r>
+          </a:p>
+          <a:p>
+            <a:pPr lvl="1"/>
+            <a:r>
+              <a:rPr lang="nl-NL" dirty="0"/>
+              <a:t>De kleuren rood, wit en zwart zijn de overheersende kleuren op de website.</a:t>
+            </a:r>
+            <a:endParaRPr lang="nl-NL" sz="2000" dirty="0"/>
+          </a:p>
+          <a:p>
+            <a:pPr lvl="1"/>
+            <a:r>
+              <a:rPr lang="nl-NL" dirty="0"/>
+              <a:t>De website is compatibel met Internet Explorer, Firefox, Chrome, Safari en Opera.</a:t>
+            </a:r>
+            <a:endParaRPr lang="nl-NL" sz="2000" dirty="0"/>
+          </a:p>
+          <a:p>
+            <a:pPr lvl="1"/>
+            <a:r>
+              <a:rPr lang="nl-NL" dirty="0"/>
+              <a:t>Een verticale </a:t>
+            </a:r>
+            <a:r>
+              <a:rPr lang="nl-NL" dirty="0" err="1"/>
+              <a:t>menu-balk</a:t>
+            </a:r>
+            <a:r>
+              <a:rPr lang="nl-NL" dirty="0"/>
+              <a:t> aan de linkerkant van de pagina</a:t>
+            </a:r>
+            <a:endParaRPr lang="nl-NL" sz="2000" dirty="0"/>
+          </a:p>
+          <a:p>
+            <a:pPr lvl="1"/>
+            <a:r>
+              <a:rPr lang="nl-NL" dirty="0"/>
+              <a:t>Afbeeldingen bij de producten</a:t>
+            </a:r>
+            <a:endParaRPr lang="nl-NL" sz="2000" dirty="0"/>
+          </a:p>
+          <a:p>
+            <a:pPr lvl="1"/>
+            <a:r>
+              <a:rPr lang="nl-NL" dirty="0"/>
+              <a:t>Producten op de productenpagina</a:t>
+            </a:r>
+            <a:endParaRPr lang="nl-NL" sz="2000" dirty="0"/>
+          </a:p>
+          <a:p>
+            <a:pPr lvl="1"/>
+            <a:r>
+              <a:rPr lang="nl-NL" dirty="0"/>
+              <a:t>Een professioneel ogend lettertype</a:t>
+            </a:r>
+            <a:endParaRPr lang="nl-NL" sz="2000" dirty="0"/>
+          </a:p>
+          <a:p>
+            <a:pPr lvl="1"/>
+            <a:r>
+              <a:rPr lang="nl-NL" dirty="0"/>
+              <a:t>Contactgegevens en aanbiedingen op de homepagina</a:t>
+            </a:r>
+            <a:endParaRPr lang="nl-NL" sz="2000" dirty="0"/>
+          </a:p>
+          <a:p>
+            <a:pPr lvl="1"/>
+            <a:r>
+              <a:rPr lang="nl-NL" dirty="0"/>
+              <a:t>Footer met adresgegevens</a:t>
+            </a:r>
+            <a:endParaRPr lang="nl-NL" sz="2000" dirty="0"/>
+          </a:p>
+          <a:p>
+            <a:pPr lvl="1"/>
+            <a:r>
+              <a:rPr lang="nl-NL" dirty="0"/>
+              <a:t>Een opvallend logo met een </a:t>
+            </a:r>
+            <a:r>
+              <a:rPr lang="nl-NL" dirty="0" smtClean="0"/>
+              <a:t>slogan</a:t>
+            </a:r>
+          </a:p>
+          <a:p>
+            <a:r>
+              <a:rPr lang="nl-NL" u="sng" dirty="0" err="1"/>
+              <a:t>Should-have’s</a:t>
+            </a:r>
+            <a:r>
+              <a:rPr lang="nl-NL" u="sng" dirty="0"/>
+              <a:t>:</a:t>
+            </a:r>
+            <a:endParaRPr lang="nl-NL" sz="2000" dirty="0"/>
+          </a:p>
+          <a:p>
+            <a:pPr lvl="1"/>
+            <a:r>
+              <a:rPr lang="nl-NL" dirty="0" err="1"/>
+              <a:t>Social</a:t>
+            </a:r>
+            <a:r>
+              <a:rPr lang="nl-NL" dirty="0"/>
+              <a:t> media </a:t>
+            </a:r>
+            <a:r>
+              <a:rPr lang="nl-NL" dirty="0" err="1"/>
+              <a:t>plugins</a:t>
+            </a:r>
+            <a:endParaRPr lang="nl-NL" sz="2000" dirty="0"/>
+          </a:p>
+          <a:p>
+            <a:pPr lvl="1"/>
+            <a:r>
+              <a:rPr lang="nl-NL" dirty="0"/>
+              <a:t>Bewegende aanbiedingen </a:t>
+            </a:r>
+            <a:endParaRPr lang="nl-NL" sz="2000" dirty="0"/>
+          </a:p>
+          <a:p>
+            <a:pPr lvl="1"/>
+            <a:r>
+              <a:rPr lang="nl-NL" dirty="0"/>
+              <a:t>Goed getoonde website op verschillende </a:t>
+            </a:r>
+            <a:r>
+              <a:rPr lang="nl-NL" dirty="0" err="1"/>
+              <a:t>devices</a:t>
+            </a:r>
+            <a:r>
+              <a:rPr lang="nl-NL" dirty="0"/>
+              <a:t> (mobiel/tablets</a:t>
+            </a:r>
+            <a:r>
+              <a:rPr lang="nl-NL" dirty="0" smtClean="0"/>
+              <a:t>)</a:t>
+            </a:r>
+            <a:r>
+              <a:rPr lang="nl-NL" dirty="0"/>
+              <a:t> </a:t>
+            </a:r>
+            <a:endParaRPr lang="nl-NL" sz="2000" dirty="0"/>
+          </a:p>
+          <a:p>
+            <a:r>
+              <a:rPr lang="nl-NL" u="sng" dirty="0" err="1"/>
+              <a:t>Could-have’s</a:t>
+            </a:r>
+            <a:r>
+              <a:rPr lang="nl-NL" u="sng" dirty="0"/>
+              <a:t>:</a:t>
+            </a:r>
+            <a:endParaRPr lang="nl-NL" sz="2000" dirty="0"/>
+          </a:p>
+          <a:p>
+            <a:pPr lvl="1"/>
+            <a:r>
+              <a:rPr lang="nl-NL" dirty="0" err="1"/>
+              <a:t>Patterns</a:t>
+            </a:r>
+            <a:r>
+              <a:rPr lang="nl-NL" dirty="0"/>
+              <a:t> (telkens terugkomende afbeeldingen)</a:t>
+            </a:r>
+            <a:endParaRPr lang="nl-NL" sz="2000" dirty="0"/>
+          </a:p>
+          <a:p>
+            <a:pPr lvl="2"/>
+            <a:endParaRPr lang="nl-NL" sz="1600" dirty="0"/>
+          </a:p>
+          <a:p>
+            <a:pPr lvl="1"/>
+            <a:endParaRPr lang="nl-NL" dirty="0"/>
           </a:p>
         </p:txBody>
       </p:sp>
@@ -3579,6 +3848,52 @@
           <a:bodyPr/>
           <a:lstStyle/>
           <a:p>
+            <a:r>
+              <a:rPr lang="nl-NL" dirty="0"/>
+              <a:t>Onderzoek naar verschillende onderdelen (menubalk bv)</a:t>
+            </a:r>
+          </a:p>
+          <a:p>
+            <a:r>
+              <a:rPr lang="nl-NL" dirty="0" smtClean="0"/>
+              <a:t>Overlegt met de opdrachtgever</a:t>
+            </a:r>
+          </a:p>
+          <a:p>
+            <a:r>
+              <a:rPr lang="nl-NL" dirty="0" smtClean="0"/>
+              <a:t>Getest op browsers</a:t>
+            </a:r>
+          </a:p>
+          <a:p>
+            <a:r>
+              <a:rPr lang="nl-NL" dirty="0" smtClean="0"/>
+              <a:t>Lettertype opgezocht</a:t>
+            </a:r>
+          </a:p>
+          <a:p>
+            <a:r>
+              <a:rPr lang="nl-NL" dirty="0" smtClean="0"/>
+              <a:t>Extra onderzoek naar </a:t>
+            </a:r>
+            <a:r>
+              <a:rPr lang="nl-NL" dirty="0" err="1" smtClean="0"/>
+              <a:t>should</a:t>
+            </a:r>
+            <a:r>
+              <a:rPr lang="nl-NL" dirty="0" smtClean="0"/>
+              <a:t> en </a:t>
+            </a:r>
+            <a:r>
+              <a:rPr lang="nl-NL" dirty="0" err="1" smtClean="0"/>
+              <a:t>could-haves</a:t>
+            </a:r>
+            <a:endParaRPr lang="nl-NL" dirty="0" smtClean="0"/>
+          </a:p>
+          <a:p>
+            <a:endParaRPr lang="nl-NL" dirty="0" smtClean="0"/>
+          </a:p>
+          <a:p>
             <a:endParaRPr lang="nl-NL" dirty="0"/>
           </a:p>
         </p:txBody>
@@ -3814,7 +4129,7 @@
           <a:p>
             <a:r>
               <a:rPr lang="nl-NL" dirty="0" smtClean="0"/>
-              <a:t>Aanpassingen na gesprek met opdrachtgever</a:t>
+              <a:t>Aanpassingen na gesprek met de opdrachtgever</a:t>
             </a:r>
           </a:p>
           <a:p>

</xml_diff>

<commit_message>
ppt, register and login forms
</commit_message>
<xml_diff>
--- a/Powerpoint-presentatie/JR-Webdevelopment presents PC4U.pptx
+++ b/Powerpoint-presentatie/JR-Webdevelopment presents PC4U.pptx
@@ -12,8 +12,7 @@
     <p:sldId id="260" r:id="rId6"/>
     <p:sldId id="261" r:id="rId7"/>
     <p:sldId id="262" r:id="rId8"/>
-    <p:sldId id="264" r:id="rId9"/>
-    <p:sldId id="263" r:id="rId10"/>
+    <p:sldId id="263" r:id="rId9"/>
   </p:sldIdLst>
   <p:sldSz cx="12192000" cy="6858000"/>
   <p:notesSz cx="6858000" cy="9144000"/>
@@ -251,7 +250,7 @@
           <a:p>
             <a:fld id="{02CEDFC6-84DF-48E9-9A82-ECD26472881E}" type="datetimeFigureOut">
               <a:rPr lang="nl-NL" smtClean="0"/>
-              <a:t>12-1-2016</a:t>
+              <a:t>18-1-2016</a:t>
             </a:fld>
             <a:endParaRPr lang="nl-NL"/>
           </a:p>
@@ -421,7 +420,7 @@
           <a:p>
             <a:fld id="{02CEDFC6-84DF-48E9-9A82-ECD26472881E}" type="datetimeFigureOut">
               <a:rPr lang="nl-NL" smtClean="0"/>
-              <a:t>12-1-2016</a:t>
+              <a:t>18-1-2016</a:t>
             </a:fld>
             <a:endParaRPr lang="nl-NL"/>
           </a:p>
@@ -601,7 +600,7 @@
           <a:p>
             <a:fld id="{02CEDFC6-84DF-48E9-9A82-ECD26472881E}" type="datetimeFigureOut">
               <a:rPr lang="nl-NL" smtClean="0"/>
-              <a:t>12-1-2016</a:t>
+              <a:t>18-1-2016</a:t>
             </a:fld>
             <a:endParaRPr lang="nl-NL"/>
           </a:p>
@@ -771,7 +770,7 @@
           <a:p>
             <a:fld id="{02CEDFC6-84DF-48E9-9A82-ECD26472881E}" type="datetimeFigureOut">
               <a:rPr lang="nl-NL" smtClean="0"/>
-              <a:t>12-1-2016</a:t>
+              <a:t>18-1-2016</a:t>
             </a:fld>
             <a:endParaRPr lang="nl-NL"/>
           </a:p>
@@ -1017,7 +1016,7 @@
           <a:p>
             <a:fld id="{02CEDFC6-84DF-48E9-9A82-ECD26472881E}" type="datetimeFigureOut">
               <a:rPr lang="nl-NL" smtClean="0"/>
-              <a:t>12-1-2016</a:t>
+              <a:t>18-1-2016</a:t>
             </a:fld>
             <a:endParaRPr lang="nl-NL"/>
           </a:p>
@@ -1249,7 +1248,7 @@
           <a:p>
             <a:fld id="{02CEDFC6-84DF-48E9-9A82-ECD26472881E}" type="datetimeFigureOut">
               <a:rPr lang="nl-NL" smtClean="0"/>
-              <a:t>12-1-2016</a:t>
+              <a:t>18-1-2016</a:t>
             </a:fld>
             <a:endParaRPr lang="nl-NL"/>
           </a:p>
@@ -1616,7 +1615,7 @@
           <a:p>
             <a:fld id="{02CEDFC6-84DF-48E9-9A82-ECD26472881E}" type="datetimeFigureOut">
               <a:rPr lang="nl-NL" smtClean="0"/>
-              <a:t>12-1-2016</a:t>
+              <a:t>18-1-2016</a:t>
             </a:fld>
             <a:endParaRPr lang="nl-NL"/>
           </a:p>
@@ -1734,7 +1733,7 @@
           <a:p>
             <a:fld id="{02CEDFC6-84DF-48E9-9A82-ECD26472881E}" type="datetimeFigureOut">
               <a:rPr lang="nl-NL" smtClean="0"/>
-              <a:t>12-1-2016</a:t>
+              <a:t>18-1-2016</a:t>
             </a:fld>
             <a:endParaRPr lang="nl-NL"/>
           </a:p>
@@ -1829,7 +1828,7 @@
           <a:p>
             <a:fld id="{02CEDFC6-84DF-48E9-9A82-ECD26472881E}" type="datetimeFigureOut">
               <a:rPr lang="nl-NL" smtClean="0"/>
-              <a:t>12-1-2016</a:t>
+              <a:t>18-1-2016</a:t>
             </a:fld>
             <a:endParaRPr lang="nl-NL"/>
           </a:p>
@@ -2106,7 +2105,7 @@
           <a:p>
             <a:fld id="{02CEDFC6-84DF-48E9-9A82-ECD26472881E}" type="datetimeFigureOut">
               <a:rPr lang="nl-NL" smtClean="0"/>
-              <a:t>12-1-2016</a:t>
+              <a:t>18-1-2016</a:t>
             </a:fld>
             <a:endParaRPr lang="nl-NL"/>
           </a:p>
@@ -2359,7 +2358,7 @@
           <a:p>
             <a:fld id="{02CEDFC6-84DF-48E9-9A82-ECD26472881E}" type="datetimeFigureOut">
               <a:rPr lang="nl-NL" smtClean="0"/>
-              <a:t>12-1-2016</a:t>
+              <a:t>18-1-2016</a:t>
             </a:fld>
             <a:endParaRPr lang="nl-NL"/>
           </a:p>
@@ -2582,7 +2581,7 @@
           <a:p>
             <a:fld id="{02CEDFC6-84DF-48E9-9A82-ECD26472881E}" type="datetimeFigureOut">
               <a:rPr lang="nl-NL" smtClean="0"/>
-              <a:t>12-1-2016</a:t>
+              <a:t>18-1-2016</a:t>
             </a:fld>
             <a:endParaRPr lang="nl-NL"/>
           </a:p>
@@ -2999,7 +2998,7 @@
         </p:nvSpPr>
         <p:spPr>
           <a:xfrm>
-            <a:off x="1523999" y="76062"/>
+            <a:off x="1523998" y="76062"/>
             <a:ext cx="9144000" cy="2387600"/>
           </a:xfrm>
         </p:spPr>
@@ -3045,7 +3044,7 @@
         </p:nvSpPr>
         <p:spPr>
           <a:xfrm>
-            <a:off x="2919411" y="2869103"/>
+            <a:off x="2919410" y="2834598"/>
             <a:ext cx="6353175" cy="1827212"/>
           </a:xfrm>
           <a:blipFill dpi="0" rotWithShape="1">
@@ -3121,6 +3120,13 @@
   <p:clrMapOvr>
     <a:masterClrMapping/>
   </p:clrMapOvr>
+  <p:timing>
+    <p:tnLst>
+      <p:par>
+        <p:cTn id="1" dur="indefinite" restart="never" nodeType="tmRoot"/>
+      </p:par>
+    </p:tnLst>
+  </p:timing>
 </p:sld>
 </file>
 
@@ -3254,6 +3260,13 @@
   <p:clrMapOvr>
     <a:masterClrMapping/>
   </p:clrMapOvr>
+  <p:timing>
+    <p:tnLst>
+      <p:par>
+        <p:cTn id="1" dur="indefinite" restart="never" nodeType="tmRoot"/>
+      </p:par>
+    </p:tnLst>
+  </p:timing>
 </p:sld>
 </file>
 
@@ -3318,8 +3331,9 @@
             </a:r>
             <a:r>
               <a:rPr lang="nl-NL" dirty="0" smtClean="0"/>
-              <a:t>project</a:t>
-            </a:r>
+              <a:t>project waar je moet samenwerken</a:t>
+            </a:r>
+            <a:endParaRPr lang="nl-NL" dirty="0" smtClean="0"/>
           </a:p>
           <a:p>
             <a:r>
@@ -3367,6 +3381,13 @@
   <p:clrMapOvr>
     <a:masterClrMapping/>
   </p:clrMapOvr>
+  <p:timing>
+    <p:tnLst>
+      <p:par>
+        <p:cTn id="1" dur="indefinite" restart="never" nodeType="tmRoot"/>
+      </p:par>
+    </p:tnLst>
+  </p:timing>
 </p:sld>
 </file>
 
@@ -3517,6 +3538,13 @@
   <p:clrMapOvr>
     <a:masterClrMapping/>
   </p:clrMapOvr>
+  <p:timing>
+    <p:tnLst>
+      <p:par>
+        <p:cTn id="1" dur="indefinite" restart="never" nodeType="tmRoot"/>
+      </p:par>
+    </p:tnLst>
+  </p:timing>
 </p:sld>
 </file>
 
@@ -3611,7 +3639,15 @@
             <a:pPr lvl="1"/>
             <a:r>
               <a:rPr lang="nl-NL" dirty="0"/>
-              <a:t>De website is compatibel met Internet Explorer, Firefox, Chrome, Safari en Opera.</a:t>
+              <a:t>De website is compatibel met Internet Explorer, Firefox, </a:t>
+            </a:r>
+            <a:r>
+              <a:rPr lang="nl-NL" dirty="0" smtClean="0"/>
+              <a:t>Chrome en </a:t>
+            </a:r>
+            <a:r>
+              <a:rPr lang="nl-NL" dirty="0"/>
+              <a:t>Opera.</a:t>
             </a:r>
             <a:endParaRPr lang="nl-NL" sz="2000" dirty="0"/>
           </a:p>
@@ -3849,8 +3885,18 @@
           <a:lstStyle/>
           <a:p>
             <a:r>
+              <a:rPr lang="nl-NL" dirty="0" smtClean="0"/>
+              <a:t>Acceptatietest laten uitvoeren</a:t>
+            </a:r>
+          </a:p>
+          <a:p>
+            <a:r>
+              <a:rPr lang="nl-NL" dirty="0" smtClean="0"/>
+              <a:t>Onderzoek </a:t>
+            </a:r>
+            <a:r>
               <a:rPr lang="nl-NL" dirty="0"/>
-              <a:t>Onderzoek naar verschillende onderdelen (menubalk bv)</a:t>
+              <a:t>naar verschillende onderdelen (menubalk bv)</a:t>
             </a:r>
           </a:p>
           <a:p>
@@ -3862,7 +3908,7 @@
           <a:p>
             <a:r>
               <a:rPr lang="nl-NL" dirty="0" smtClean="0"/>
-              <a:t>Getest op browsers</a:t>
+              <a:t>Getest op de 4 populairste browsers</a:t>
             </a:r>
           </a:p>
           <a:p>
@@ -3882,7 +3928,11 @@
             </a:r>
             <a:r>
               <a:rPr lang="nl-NL" dirty="0" smtClean="0"/>
-              <a:t> en </a:t>
+              <a:t>- </a:t>
+            </a:r>
+            <a:r>
+              <a:rPr lang="nl-NL" dirty="0" smtClean="0"/>
+              <a:t>en </a:t>
             </a:r>
             <a:r>
               <a:rPr lang="nl-NL" dirty="0" err="1" smtClean="0"/>
@@ -4025,7 +4075,7 @@
               <a:rPr lang="nl-NL" b="1" dirty="0" smtClean="0">
                 <a:hlinkClick r:id="rId3"/>
               </a:rPr>
-              <a:t>www.ronaldklaus.radiusdev.nl</a:t>
+              <a:t>ronaldklaus.radiusdev.nl</a:t>
             </a:r>
             <a:r>
               <a:rPr lang="nl-NL" b="1" dirty="0" smtClean="0"/>
@@ -4049,112 +4099,6 @@
 </file>
 
 <file path=ppt/slides/slide8.xml><?xml version="1.0" encoding="utf-8"?>
-<p:sld xmlns:a="http://schemas.openxmlformats.org/drawingml/2006/main" xmlns:r="http://schemas.openxmlformats.org/officeDocument/2006/relationships" xmlns:p="http://schemas.openxmlformats.org/presentationml/2006/main">
-  <p:cSld>
-    <p:spTree>
-      <p:nvGrpSpPr>
-        <p:cNvPr id="1" name=""/>
-        <p:cNvGrpSpPr/>
-        <p:nvPr/>
-      </p:nvGrpSpPr>
-      <p:grpSpPr>
-        <a:xfrm>
-          <a:off x="0" y="0"/>
-          <a:ext cx="0" cy="0"/>
-          <a:chOff x="0" y="0"/>
-          <a:chExt cx="0" cy="0"/>
-        </a:xfrm>
-      </p:grpSpPr>
-      <p:sp>
-        <p:nvSpPr>
-          <p:cNvPr id="2" name="Titel 1"/>
-          <p:cNvSpPr>
-            <a:spLocks noGrp="1"/>
-          </p:cNvSpPr>
-          <p:nvPr>
-            <p:ph type="title"/>
-          </p:nvPr>
-        </p:nvSpPr>
-        <p:spPr/>
-        <p:txBody>
-          <a:bodyPr/>
-          <a:lstStyle/>
-          <a:p>
-            <a:r>
-              <a:rPr lang="nl-NL" b="1" dirty="0" smtClean="0"/>
-              <a:t>Het eindproduct</a:t>
-            </a:r>
-            <a:endParaRPr lang="nl-NL" b="1" dirty="0"/>
-          </a:p>
-        </p:txBody>
-      </p:sp>
-      <p:sp>
-        <p:nvSpPr>
-          <p:cNvPr id="3" name="Tijdelijke aanduiding voor inhoud 2"/>
-          <p:cNvSpPr>
-            <a:spLocks noGrp="1"/>
-          </p:cNvSpPr>
-          <p:nvPr>
-            <p:ph idx="1"/>
-          </p:nvPr>
-        </p:nvSpPr>
-        <p:spPr/>
-        <p:txBody>
-          <a:bodyPr/>
-          <a:lstStyle/>
-          <a:p>
-            <a:r>
-              <a:rPr lang="nl-NL" dirty="0" smtClean="0"/>
-              <a:t>Verticale menubalk</a:t>
-            </a:r>
-          </a:p>
-          <a:p>
-            <a:r>
-              <a:rPr lang="nl-NL" dirty="0" smtClean="0"/>
-              <a:t>Kleurgebruik</a:t>
-            </a:r>
-          </a:p>
-          <a:p>
-            <a:r>
-              <a:rPr lang="nl-NL" dirty="0" smtClean="0"/>
-              <a:t>Webshop</a:t>
-            </a:r>
-          </a:p>
-          <a:p>
-            <a:r>
-              <a:rPr lang="nl-NL" dirty="0" smtClean="0"/>
-              <a:t>Header en footer</a:t>
-            </a:r>
-          </a:p>
-          <a:p>
-            <a:r>
-              <a:rPr lang="nl-NL" dirty="0" smtClean="0"/>
-              <a:t>Aanpassingen na gesprek met de opdrachtgever</a:t>
-            </a:r>
-          </a:p>
-          <a:p>
-            <a:r>
-              <a:rPr lang="nl-NL" dirty="0" smtClean="0"/>
-              <a:t>HTML en CSS</a:t>
-            </a:r>
-            <a:endParaRPr lang="nl-NL" dirty="0"/>
-          </a:p>
-        </p:txBody>
-      </p:sp>
-    </p:spTree>
-    <p:extLst>
-      <p:ext uri="{BB962C8B-B14F-4D97-AF65-F5344CB8AC3E}">
-        <p14:creationId xmlns:p14="http://schemas.microsoft.com/office/powerpoint/2010/main" val="3536917302"/>
-      </p:ext>
-    </p:extLst>
-  </p:cSld>
-  <p:clrMapOvr>
-    <a:masterClrMapping/>
-  </p:clrMapOvr>
-</p:sld>
-</file>
-
-<file path=ppt/slides/slide9.xml><?xml version="1.0" encoding="utf-8"?>
 <p:sld xmlns:a="http://schemas.openxmlformats.org/drawingml/2006/main" xmlns:r="http://schemas.openxmlformats.org/officeDocument/2006/relationships" xmlns:p="http://schemas.openxmlformats.org/presentationml/2006/main">
   <p:cSld>
     <p:spTree>

</xml_diff>